<commit_message>
Removed delete me files. Added connection string to the Web.config, update to sprint 1 presentation slides.
</commit_message>
<xml_diff>
--- a/Documentation/Sprint1-PresentationSlides.pptx
+++ b/Documentation/Sprint1-PresentationSlides.pptx
@@ -6955,6 +6955,13 @@
   <p:clrMapOvr>
     <a:masterClrMapping/>
   </p:clrMapOvr>
+  <p:timing>
+    <p:tnLst>
+      <p:par>
+        <p:cTn id="1" dur="indefinite" restart="never" nodeType="tmRoot"/>
+      </p:par>
+    </p:tnLst>
+  </p:timing>
 </p:sld>
 </file>
 
@@ -7126,6 +7133,13 @@
   <p:clrMapOvr>
     <a:masterClrMapping/>
   </p:clrMapOvr>
+  <p:timing>
+    <p:tnLst>
+      <p:par>
+        <p:cTn id="1" dur="indefinite" restart="never" nodeType="tmRoot"/>
+      </p:par>
+    </p:tnLst>
+  </p:timing>
 </p:sld>
 </file>
 

</xml_diff>